<commit_message>
Adding Files to the repo
</commit_message>
<xml_diff>
--- a/Lending_club_case_study.pptx
+++ b/Lending_club_case_study.pptx
@@ -4888,8 +4888,8 @@
         </p:blipFill>
         <p:spPr>
           <a:xfrm>
-            <a:off x="251460" y="2204720"/>
-            <a:ext cx="8509635" cy="4320540"/>
+            <a:off x="251460" y="2432685"/>
+            <a:ext cx="8509635" cy="4092575"/>
           </a:xfrm>
           <a:prstGeom prst="rect">
             <a:avLst/>
@@ -5395,7 +5395,7 @@
         </p:nvSpPr>
         <p:spPr>
           <a:xfrm>
-            <a:off x="457200" y="1174750"/>
+            <a:off x="457200" y="1340485"/>
             <a:ext cx="8047990" cy="625475"/>
           </a:xfrm>
         </p:spPr>
@@ -5407,7 +5407,7 @@
           <a:p>
             <a:r>
               <a:rPr lang="en-US" sz="1800" dirty="0" smtClean="0"/>
-              <a:t>Interest rates decrease with increase in dti which seems a fair observation. </a:t>
+              <a:t>Interest rates increases with increase in dti which seems a fair observation. </a:t>
             </a:r>
             <a:endParaRPr lang="en-IN" sz="1800" dirty="0"/>
           </a:p>
@@ -5606,7 +5606,26 @@
                 </a:ln>
                 <a:effectLst/>
               </a:rPr>
-              <a:t>Loans with more annual income range have lesser chances of charge off than those with lower annual income.</a:t>
+              <a:t>Loans with more annual income range have lesser </a:t>
+            </a:r>
+            <a:r>
+              <a:rPr lang="en-US" sz="1800" dirty="0" smtClean="0">
+                <a:ln>
+                  <a:noFill/>
+                </a:ln>
+                <a:effectLst/>
+                <a:sym typeface="+mn-ea"/>
+              </a:rPr>
+              <a:t>percentage </a:t>
+            </a:r>
+            <a:r>
+              <a:rPr lang="en-US" sz="1800" dirty="0" smtClean="0">
+                <a:ln>
+                  <a:noFill/>
+                </a:ln>
+                <a:effectLst/>
+              </a:rPr>
+              <a:t>of deafualts than those with lower annual income.</a:t>
             </a:r>
             <a:endParaRPr lang="en-US" sz="1800" dirty="0" smtClean="0">
               <a:ln>
@@ -5623,7 +5642,26 @@
                 </a:ln>
                 <a:effectLst/>
               </a:rPr>
-              <a:t>Loans with 60 moths term have more chances of default.</a:t>
+              <a:t>Loans with 60 moths term have more </a:t>
+            </a:r>
+            <a:r>
+              <a:rPr lang="en-US" sz="1800" dirty="0" smtClean="0">
+                <a:ln>
+                  <a:noFill/>
+                </a:ln>
+                <a:effectLst/>
+                <a:sym typeface="+mn-ea"/>
+              </a:rPr>
+              <a:t>percentage </a:t>
+            </a:r>
+            <a:r>
+              <a:rPr lang="en-US" sz="1800" dirty="0" smtClean="0">
+                <a:ln>
+                  <a:noFill/>
+                </a:ln>
+                <a:effectLst/>
+              </a:rPr>
+              <a:t>of loan defaults.</a:t>
             </a:r>
             <a:endParaRPr lang="en-US" sz="1800" dirty="0" smtClean="0">
               <a:ln>
@@ -5640,7 +5678,26 @@
                 </a:ln>
                 <a:effectLst/>
               </a:rPr>
-              <a:t>As the revolving credit utilization percentages of borrowers increases the loan default chances increases</a:t>
+              <a:t>As the revolving credit utilization percentages of borrowers increases the </a:t>
+            </a:r>
+            <a:r>
+              <a:rPr lang="en-US" sz="1800" dirty="0" smtClean="0">
+                <a:ln>
+                  <a:noFill/>
+                </a:ln>
+                <a:effectLst/>
+                <a:sym typeface="+mn-ea"/>
+              </a:rPr>
+              <a:t>percentage </a:t>
+            </a:r>
+            <a:r>
+              <a:rPr lang="en-US" sz="1800" dirty="0" smtClean="0">
+                <a:ln>
+                  <a:noFill/>
+                </a:ln>
+                <a:effectLst/>
+              </a:rPr>
+              <a:t>of loan defaults increases.</a:t>
             </a:r>
             <a:endParaRPr lang="en-US" sz="1800" dirty="0" smtClean="0">
               <a:ln>
@@ -5657,7 +5714,26 @@
                 </a:ln>
                 <a:effectLst/>
               </a:rPr>
-              <a:t>With increase in Term of loan, chances of default also increases.</a:t>
+              <a:t>With increase in Term of loan, </a:t>
+            </a:r>
+            <a:r>
+              <a:rPr lang="en-US" sz="1800" dirty="0" smtClean="0">
+                <a:ln>
+                  <a:noFill/>
+                </a:ln>
+                <a:effectLst/>
+                <a:sym typeface="+mn-ea"/>
+              </a:rPr>
+              <a:t>percentage </a:t>
+            </a:r>
+            <a:r>
+              <a:rPr lang="en-US" sz="1800" dirty="0" smtClean="0">
+                <a:ln>
+                  <a:noFill/>
+                </a:ln>
+                <a:effectLst/>
+              </a:rPr>
+              <a:t>of loan defaults also increases.</a:t>
             </a:r>
             <a:endParaRPr lang="en-US" sz="1800" dirty="0" smtClean="0">
               <a:ln>
@@ -5705,7 +5781,7 @@
         </p:nvSpPr>
         <p:spPr>
           <a:xfrm>
-            <a:off x="-635" y="1340485"/>
+            <a:off x="0" y="1340485"/>
             <a:ext cx="8749030" cy="2600325"/>
           </a:xfrm>
         </p:spPr>
@@ -6147,73 +6223,9 @@
                   <a:srgbClr val="002060"/>
                 </a:solidFill>
               </a:rPr>
-              <a:t>The purpose of our analysis is to look for patterns which could indicate if a person is likely to </a:t>
-            </a:r>
-            <a:r>
-              <a:rPr lang="en-US" sz="1600" b="1" dirty="0">
-                <a:solidFill>
-                  <a:srgbClr val="002060"/>
-                </a:solidFill>
-              </a:rPr>
-              <a:t>default</a:t>
-            </a:r>
-            <a:r>
-              <a:rPr lang="en-US" sz="1600" dirty="0">
-                <a:solidFill>
-                  <a:srgbClr val="002060"/>
-                </a:solidFill>
-              </a:rPr>
-              <a:t>, which may be used for taking actions such as </a:t>
-            </a:r>
-            <a:r>
-              <a:rPr lang="en-US" sz="1600" b="1" dirty="0">
-                <a:solidFill>
-                  <a:srgbClr val="002060"/>
-                </a:solidFill>
-              </a:rPr>
-              <a:t>denying </a:t>
-            </a:r>
-            <a:r>
-              <a:rPr lang="en-US" sz="1600" dirty="0">
-                <a:solidFill>
-                  <a:srgbClr val="002060"/>
-                </a:solidFill>
-              </a:rPr>
-              <a:t>the loan, </a:t>
-            </a:r>
-            <a:r>
-              <a:rPr lang="en-US" sz="1600" b="1" dirty="0">
-                <a:solidFill>
-                  <a:srgbClr val="002060"/>
-                </a:solidFill>
-              </a:rPr>
-              <a:t>reducing </a:t>
-            </a:r>
-            <a:r>
-              <a:rPr lang="en-US" sz="1600" dirty="0">
-                <a:solidFill>
-                  <a:srgbClr val="002060"/>
-                </a:solidFill>
-              </a:rPr>
-              <a:t>the amount of loan, lending (to risky applicants) at a </a:t>
-            </a:r>
-            <a:r>
-              <a:rPr lang="en-US" sz="1600" b="1" dirty="0">
-                <a:solidFill>
-                  <a:srgbClr val="002060"/>
-                </a:solidFill>
-              </a:rPr>
-              <a:t>higher interest </a:t>
-            </a:r>
-            <a:r>
-              <a:rPr lang="en-US" sz="1600" dirty="0">
-                <a:solidFill>
-                  <a:srgbClr val="002060"/>
-                </a:solidFill>
-              </a:rPr>
-              <a:t>rate, etc.</a:t>
-            </a:r>
-            <a:endParaRPr lang="en-US" sz="1600" b="1" dirty="0">
+              <a:t>The purpose of our analysis is to understand the driving factors behind loan default. We have to look for indicators(variables) which are correlated with defaulting.</a:t>
+            </a:r>
+            <a:endParaRPr lang="en-US" sz="1600" dirty="0">
               <a:solidFill>
                 <a:srgbClr val="002060"/>
               </a:solidFill>
@@ -6455,7 +6467,7 @@
                   </a:innerShdw>
                 </a:effectLst>
               </a:rPr>
-              <a:t>As we move from Grade A to Grade G, interest rate increases and so does the chances of loan defaults.</a:t>
+              <a:t>As we move from Grade A to Grade G, interest rate increases and so does the percentage of loan defaults.</a:t>
             </a:r>
             <a:endParaRPr lang="en-US" sz="2400" dirty="0">
               <a:ln>
@@ -6488,7 +6500,42 @@
                   </a:innerShdw>
                 </a:effectLst>
               </a:rPr>
-              <a:t>Another thing to observe is that with increase in annual income, the chances of defaulting of loan decreases.</a:t>
+              <a:t>Another thing to observe is that with increase in annual income, the </a:t>
+            </a:r>
+            <a:r>
+              <a:rPr lang="en-US" sz="2400" dirty="0">
+                <a:ln>
+                  <a:solidFill>
+                    <a:srgbClr val="00B0F0"/>
+                  </a:solidFill>
+                </a:ln>
+                <a:effectLst>
+                  <a:innerShdw blurRad="63500" dist="50800" dir="18900000">
+                    <a:prstClr val="black">
+                      <a:alpha val="50000"/>
+                    </a:prstClr>
+                  </a:innerShdw>
+                </a:effectLst>
+                <a:sym typeface="+mn-ea"/>
+              </a:rPr>
+              <a:t>percentage </a:t>
+            </a:r>
+            <a:r>
+              <a:rPr lang="en-US" sz="2400" dirty="0">
+                <a:ln>
+                  <a:solidFill>
+                    <a:srgbClr val="00B0F0"/>
+                  </a:solidFill>
+                </a:ln>
+                <a:effectLst>
+                  <a:innerShdw blurRad="63500" dist="50800" dir="18900000">
+                    <a:prstClr val="black">
+                      <a:alpha val="50000"/>
+                    </a:prstClr>
+                  </a:innerShdw>
+                </a:effectLst>
+              </a:rPr>
+              <a:t>of loan default decreases.</a:t>
             </a:r>
             <a:endParaRPr lang="en-US" sz="2400" dirty="0">
               <a:ln>
@@ -6521,27 +6568,43 @@
                   </a:innerShdw>
                 </a:effectLst>
               </a:rPr>
-              <a:t>With increase in Term of loan, chances of default also increases.. </a:t>
-            </a:r>
-            <a:endParaRPr lang="en-US" sz="2400" dirty="0">
-              <a:ln>
-                <a:solidFill>
-                  <a:srgbClr val="00B0F0"/>
-                </a:solidFill>
-              </a:ln>
-              <a:effectLst>
-                <a:innerShdw blurRad="63500" dist="50800" dir="18900000">
-                  <a:prstClr val="black">
-                    <a:alpha val="50000"/>
-                  </a:prstClr>
-                </a:innerShdw>
-              </a:effectLst>
-            </a:endParaRPr>
-          </a:p>
-          <a:p>
-            <a:pPr marL="0" indent="0">
-              <a:buNone/>
-            </a:pPr>
+              <a:t>With increase in Term of loan, </a:t>
+            </a:r>
+            <a:r>
+              <a:rPr lang="en-US" sz="2400" dirty="0">
+                <a:ln>
+                  <a:solidFill>
+                    <a:srgbClr val="00B0F0"/>
+                  </a:solidFill>
+                </a:ln>
+                <a:effectLst>
+                  <a:innerShdw blurRad="63500" dist="50800" dir="18900000">
+                    <a:prstClr val="black">
+                      <a:alpha val="50000"/>
+                    </a:prstClr>
+                  </a:innerShdw>
+                </a:effectLst>
+                <a:sym typeface="+mn-ea"/>
+              </a:rPr>
+              <a:t>percentage of </a:t>
+            </a:r>
+            <a:r>
+              <a:rPr lang="en-US" sz="2400" dirty="0">
+                <a:ln>
+                  <a:solidFill>
+                    <a:srgbClr val="00B0F0"/>
+                  </a:solidFill>
+                </a:ln>
+                <a:effectLst>
+                  <a:innerShdw blurRad="63500" dist="50800" dir="18900000">
+                    <a:prstClr val="black">
+                      <a:alpha val="50000"/>
+                    </a:prstClr>
+                  </a:innerShdw>
+                </a:effectLst>
+              </a:rPr>
+              <a:t>loan default also increases.</a:t>
+            </a:r>
             <a:endParaRPr lang="en-US" sz="1800" dirty="0"/>
           </a:p>
           <a:p>
@@ -6656,7 +6719,7 @@
                   </a:innerShdw>
                 </a:effectLst>
               </a:rPr>
-              <a:t>As the revolving credit utilization percentages of borrowers increases the loan default chances increases</a:t>
+              <a:t>As the revolving credit utilization of borrowers increases the percentage of loan defaults also increases</a:t>
             </a:r>
             <a:endParaRPr lang="en-US" sz="2400" dirty="0">
               <a:ln>
@@ -6689,7 +6752,7 @@
                   </a:innerShdw>
                 </a:effectLst>
               </a:rPr>
-              <a:t>Loans taken for the purpose of Debt consolidation and credit card have more chances of default.</a:t>
+              <a:t>Loans taken for the purpose of Debt consolidation and credit card have more percentage of loan defaults.</a:t>
             </a:r>
             <a:endParaRPr lang="en-US" sz="2400" dirty="0">
               <a:ln>
@@ -6723,7 +6786,7 @@
                 </a:effectLst>
                 <a:sym typeface="+mn-ea"/>
               </a:rPr>
-              <a:t>State CA ,NY, FL have high chances of getting defaulted.</a:t>
+              <a:t>In the state of CA ,NY and FL, the percentage of loan defaults is more.</a:t>
             </a:r>
             <a:endParaRPr lang="en-US" sz="2400" dirty="0">
               <a:ln>
@@ -6758,7 +6821,7 @@
                 </a:effectLst>
                 <a:sym typeface="+mn-ea"/>
               </a:rPr>
-              <a:t>DTI is of great relevance and chances of default increases with increse in dti.</a:t>
+              <a:t>dti is of great relevance and percentage of loan default also increases with increse in dti.</a:t>
             </a:r>
             <a:endParaRPr lang="en-US" sz="2400" dirty="0">
               <a:ln>

</xml_diff>